<commit_message>
Add Readme and update powerpoints
</commit_message>
<xml_diff>
--- a/template/firstBureauTemplate.pptx
+++ b/template/firstBureauTemplate.pptx
@@ -28614,9 +28614,9 @@
         <p:grpSpPr>
           <a:xfrm>
             <a:off x="1559726" y="2601670"/>
-            <a:ext cx="4942165" cy="1185178"/>
+            <a:ext cx="4942165" cy="1149399"/>
             <a:chOff x="1559726" y="2601670"/>
-            <a:chExt cx="4942165" cy="1185178"/>
+            <a:chExt cx="4942165" cy="1149399"/>
           </a:xfrm>
         </p:grpSpPr>
         <p:sp>
@@ -28634,7 +28634,7 @@
           <p:spPr>
             <a:xfrm>
               <a:off x="1559726" y="3002018"/>
-              <a:ext cx="4942165" cy="784830"/>
+              <a:ext cx="4942165" cy="749051"/>
             </a:xfrm>
             <a:prstGeom prst="rect">
               <a:avLst/>
@@ -28677,7 +28677,7 @@
                   </a:solidFill>
                   <a:latin typeface="Odibee Sans"/>
                 </a:rPr>
-                <a:t>ΤΖΕΡΕΜΕΣ Λ.</a:t>
+                <a:t>ΟΝΟΜΑ Α.</a:t>
               </a:r>
               <a:r>
                 <a:rPr lang="el-GR" sz="1500" spc="300" dirty="0">
@@ -28708,11 +28708,20 @@
               <a:r>
                 <a:rPr lang="el-GR" sz="1500" spc="300" dirty="0">
                   <a:solidFill>
+                    <a:schemeClr val="accent6"/>
+                  </a:solidFill>
+                  <a:latin typeface="Odibee Sans"/>
+                </a:rPr>
+                <a:t>ΟΝΟΜΑ Β</a:t>
+              </a:r>
+              <a:r>
+                <a:rPr lang="el-GR" sz="1500" spc="300" dirty="0">
+                  <a:solidFill>
                     <a:srgbClr val="F9A811"/>
                   </a:solidFill>
                   <a:latin typeface="Odibee Sans"/>
                 </a:rPr>
-                <a:t>ΓΙΑΝΝΑΚΙΔΗΣ Χ.</a:t>
+                <a:t>.</a:t>
               </a:r>
             </a:p>
           </p:txBody>
@@ -29461,9 +29470,9 @@
         <p:grpSpPr>
           <a:xfrm>
             <a:off x="6501892" y="2601669"/>
-            <a:ext cx="5248924" cy="1203862"/>
+            <a:ext cx="5248924" cy="1168083"/>
             <a:chOff x="6501892" y="2601669"/>
-            <a:chExt cx="5248924" cy="1203862"/>
+            <a:chExt cx="5248924" cy="1168083"/>
           </a:xfrm>
         </p:grpSpPr>
         <p:sp>
@@ -29557,7 +29566,7 @@
           <p:spPr>
             <a:xfrm>
               <a:off x="6501892" y="3020701"/>
-              <a:ext cx="5248924" cy="784830"/>
+              <a:ext cx="5248924" cy="749051"/>
             </a:xfrm>
             <a:prstGeom prst="rect">
               <a:avLst/>
@@ -29596,13 +29605,22 @@
                 <a:t>ΛΓΟΣ (ΠΖ) </a:t>
               </a:r>
               <a:r>
+                <a:rPr lang="el-GR" sz="1500" spc="300" dirty="0">
+                  <a:solidFill>
+                    <a:schemeClr val="accent6"/>
+                  </a:solidFill>
+                  <a:latin typeface="Odibee Sans"/>
+                </a:rPr>
+                <a:t>ΟΝΟΜΑ Α</a:t>
+              </a:r>
+              <a:r>
                 <a:rPr lang="el-GR" sz="1500" spc="300" noProof="0" dirty="0">
                   <a:solidFill>
                     <a:srgbClr val="F9A811"/>
                   </a:solidFill>
                   <a:latin typeface="Odibee Sans"/>
                 </a:rPr>
-                <a:t>ΣΤΡΑΤΙΚΟΠΟΥΛΟΣ Ι.</a:t>
+                <a:t>.</a:t>
               </a:r>
               <a:endParaRPr lang="el-GR" sz="1500" spc="300" dirty="0">
                 <a:solidFill>
@@ -29630,11 +29648,20 @@
               <a:r>
                 <a:rPr lang="el-GR" sz="1500" spc="300" dirty="0">
                   <a:solidFill>
+                    <a:schemeClr val="accent6"/>
+                  </a:solidFill>
+                  <a:latin typeface="Odibee Sans"/>
+                </a:rPr>
+                <a:t>ΟΝΟΜΑ Β</a:t>
+              </a:r>
+              <a:r>
+                <a:rPr lang="el-GR" sz="1500" spc="300" dirty="0">
+                  <a:solidFill>
                     <a:srgbClr val="F9A811"/>
                   </a:solidFill>
                   <a:latin typeface="Odibee Sans"/>
                 </a:rPr>
-                <a:t>ΠΗΛΙΓΚΟΥ Ο.</a:t>
+                <a:t>.</a:t>
               </a:r>
             </a:p>
           </p:txBody>
@@ -29649,9 +29676,9 @@
         <p:grpSpPr>
           <a:xfrm>
             <a:off x="1529246" y="4046221"/>
-            <a:ext cx="5248924" cy="1251703"/>
+            <a:ext cx="5248924" cy="1215924"/>
             <a:chOff x="1529246" y="4046221"/>
-            <a:chExt cx="5248924" cy="1251703"/>
+            <a:chExt cx="5248924" cy="1215924"/>
           </a:xfrm>
         </p:grpSpPr>
         <p:sp>
@@ -29737,7 +29764,7 @@
           <p:spPr>
             <a:xfrm>
               <a:off x="1529246" y="4513094"/>
-              <a:ext cx="5248924" cy="784830"/>
+              <a:ext cx="5248924" cy="749051"/>
             </a:xfrm>
             <a:prstGeom prst="rect">
               <a:avLst/>
@@ -29767,20 +29794,29 @@
               <a:r>
                 <a:rPr lang="el-GR" sz="1500" spc="300" dirty="0">
                   <a:solidFill>
+                    <a:schemeClr val="accent6"/>
+                  </a:solidFill>
+                  <a:latin typeface="Odibee Sans"/>
+                </a:rPr>
+                <a:t>ΟΝΟΜΑ Α</a:t>
+              </a:r>
+              <a:r>
+                <a:rPr lang="el-GR" sz="1500" spc="300" noProof="0" dirty="0">
+                  <a:solidFill>
                     <a:srgbClr val="F9A811"/>
                   </a:solidFill>
                   <a:latin typeface="Odibee Sans"/>
                 </a:rPr>
-                <a:t>ΚΥΛΗΣ Ι. </a:t>
+                <a:t>. </a:t>
               </a:r>
-            </a:p>
-            <a:p>
-              <a:pPr lvl="0" algn="ctr">
-                <a:lnSpc>
-                  <a:spcPct val="150000"/>
-                </a:lnSpc>
-                <a:defRPr/>
-              </a:pPr>
+              <a:br>
+                <a:rPr lang="el-GR" sz="1500" spc="300" noProof="0" dirty="0">
+                  <a:solidFill>
+                    <a:srgbClr val="F9A811"/>
+                  </a:solidFill>
+                  <a:latin typeface="Odibee Sans"/>
+                </a:rPr>
+              </a:br>
               <a:r>
                 <a:rPr lang="el-GR" sz="1500" spc="300" dirty="0">
                   <a:solidFill>
@@ -29793,11 +29829,20 @@
               <a:r>
                 <a:rPr lang="el-GR" sz="1500" spc="300" dirty="0">
                   <a:solidFill>
+                    <a:schemeClr val="accent6"/>
+                  </a:solidFill>
+                  <a:latin typeface="Odibee Sans"/>
+                </a:rPr>
+                <a:t>ΟΝΟΜΑ Β</a:t>
+              </a:r>
+              <a:r>
+                <a:rPr lang="el-GR" sz="1500" spc="300" dirty="0">
+                  <a:solidFill>
                     <a:srgbClr val="F9A811"/>
                   </a:solidFill>
                   <a:latin typeface="Odibee Sans"/>
                 </a:rPr>
-                <a:t>ΤΣΑΒΔΑΡΙΔΟΥ Α.</a:t>
+                <a:t>.</a:t>
               </a:r>
             </a:p>
           </p:txBody>
@@ -29819,7 +29864,7 @@
         <p14:prism isContent="1"/>
       </p:transition>
     </mc:Choice>
-    <mc:Fallback xmlns:a16="http://schemas.microsoft.com/office/drawing/2014/main" xmlns="">
+    <mc:Fallback xmlns="" xmlns:a16="http://schemas.microsoft.com/office/drawing/2014/main">
       <p:transition spd="slow">
         <p:fade/>
       </p:transition>
@@ -30115,9 +30160,9 @@
         <p:grpSpPr>
           <a:xfrm>
             <a:off x="1588484" y="2601670"/>
-            <a:ext cx="5248924" cy="1223071"/>
+            <a:ext cx="5248924" cy="1187292"/>
             <a:chOff x="1588484" y="2601670"/>
-            <a:chExt cx="5248924" cy="1223071"/>
+            <a:chExt cx="5248924" cy="1187292"/>
           </a:xfrm>
         </p:grpSpPr>
         <p:sp>
@@ -30135,7 +30180,7 @@
           <p:spPr>
             <a:xfrm>
               <a:off x="1588484" y="3039911"/>
-              <a:ext cx="5248924" cy="784830"/>
+              <a:ext cx="5248924" cy="749051"/>
             </a:xfrm>
             <a:prstGeom prst="rect">
               <a:avLst/>
@@ -30165,21 +30210,27 @@
               <a:r>
                 <a:rPr lang="el-GR" sz="1500" spc="300" dirty="0">
                   <a:solidFill>
-                    <a:srgbClr val="F9A811"/>
+                    <a:schemeClr val="accent6"/>
                   </a:solidFill>
                   <a:latin typeface="Odibee Sans"/>
                 </a:rPr>
-                <a:t>ΧΛΙΜΙΤΖΑΣ Ι</a:t>
+                <a:t>ΟΝΟΜΑ Α</a:t>
               </a:r>
               <a:r>
-                <a:rPr lang="el-GR" sz="1500" spc="300" dirty="0">
+                <a:rPr lang="el-GR" sz="1500" spc="300" noProof="0" dirty="0">
                   <a:solidFill>
-                    <a:srgbClr val="F9A911"/>
+                    <a:srgbClr val="F9A811"/>
                   </a:solidFill>
                   <a:latin typeface="Odibee Sans"/>
                 </a:rPr>
                 <a:t>.</a:t>
               </a:r>
+              <a:endParaRPr lang="el-GR" sz="1500" spc="300" dirty="0">
+                <a:solidFill>
+                  <a:srgbClr val="F9A911"/>
+                </a:solidFill>
+                <a:latin typeface="Odibee Sans"/>
+              </a:endParaRPr>
             </a:p>
             <a:p>
               <a:pPr algn="ctr">
@@ -30949,9 +31000,9 @@
         <p:grpSpPr>
           <a:xfrm>
             <a:off x="6346571" y="2601670"/>
-            <a:ext cx="5248924" cy="1177490"/>
+            <a:ext cx="5248924" cy="1141711"/>
             <a:chOff x="6346571" y="2601670"/>
-            <a:chExt cx="5248924" cy="1177490"/>
+            <a:chExt cx="5248924" cy="1141711"/>
           </a:xfrm>
         </p:grpSpPr>
         <p:sp>
@@ -31045,7 +31096,7 @@
           <p:spPr>
             <a:xfrm>
               <a:off x="6346571" y="2994330"/>
-              <a:ext cx="5248924" cy="784830"/>
+              <a:ext cx="5248924" cy="749051"/>
             </a:xfrm>
             <a:prstGeom prst="rect">
               <a:avLst/>
@@ -31072,11 +31123,20 @@
               <a:r>
                 <a:rPr lang="el-GR" sz="1500" spc="300" dirty="0">
                   <a:solidFill>
+                    <a:schemeClr val="accent6"/>
+                  </a:solidFill>
+                  <a:latin typeface="Odibee Sans"/>
+                </a:rPr>
+                <a:t>ΟΝΟΜΑ Α</a:t>
+              </a:r>
+              <a:r>
+                <a:rPr lang="el-GR" sz="1500" spc="300" noProof="0" dirty="0">
+                  <a:solidFill>
                     <a:srgbClr val="F9A811"/>
                   </a:solidFill>
                   <a:latin typeface="Odibee Sans"/>
                 </a:rPr>
-                <a:t>ΤΣΕΛΙΟΣ Π.</a:t>
+                <a:t>.</a:t>
               </a:r>
               <a:endParaRPr lang="el-GR" sz="1500" spc="300" dirty="0">
                 <a:solidFill>
@@ -31240,21 +31300,27 @@
               <a:r>
                 <a:rPr lang="el-GR" sz="1500" spc="300" dirty="0">
                   <a:solidFill>
-                    <a:srgbClr val="F9A811"/>
+                    <a:schemeClr val="accent6"/>
                   </a:solidFill>
                   <a:latin typeface="Odibee Sans"/>
                 </a:rPr>
-                <a:t>ΧΛΙΜΙΤΖΑΣ Ι</a:t>
+                <a:t>ΟΝΟΜΑ Α</a:t>
               </a:r>
               <a:r>
-                <a:rPr lang="el-GR" sz="1500" spc="300" dirty="0">
+                <a:rPr lang="el-GR" sz="1500" spc="300" noProof="0" dirty="0">
                   <a:solidFill>
-                    <a:srgbClr val="F9A911"/>
+                    <a:srgbClr val="F9A811"/>
                   </a:solidFill>
                   <a:latin typeface="Odibee Sans"/>
                 </a:rPr>
                 <a:t>.</a:t>
               </a:r>
+              <a:endParaRPr lang="el-GR" sz="1500" spc="300" dirty="0">
+                <a:solidFill>
+                  <a:srgbClr val="F9A911"/>
+                </a:solidFill>
+                <a:latin typeface="Odibee Sans"/>
+              </a:endParaRPr>
             </a:p>
             <a:p>
               <a:pPr lvl="0" algn="ctr">
@@ -31298,7 +31364,7 @@
         <p14:prism isContent="1"/>
       </p:transition>
     </mc:Choice>
-    <mc:Fallback xmlns:a16="http://schemas.microsoft.com/office/drawing/2014/main" xmlns="">
+    <mc:Fallback xmlns="" xmlns:a16="http://schemas.microsoft.com/office/drawing/2014/main">
       <p:transition spd="slow">
         <p:fade/>
       </p:transition>
@@ -36578,7 +36644,7 @@
         <p14:prism isContent="1"/>
       </p:transition>
     </mc:Choice>
-    <mc:Fallback xmlns:a16="http://schemas.microsoft.com/office/drawing/2014/main" xmlns="">
+    <mc:Fallback xmlns="" xmlns:a16="http://schemas.microsoft.com/office/drawing/2014/main">
       <p:transition spd="slow">
         <p:fade/>
       </p:transition>
@@ -38127,36 +38193,6 @@
           </p:txBody>
         </p:sp>
       </p:grpSp>
-      <p:pic>
-        <p:nvPicPr>
-          <p:cNvPr id="88" name="Εικόνα 3">
-            <a:extLst>
-              <a:ext uri="{FF2B5EF4-FFF2-40B4-BE49-F238E27FC236}">
-                <a16:creationId xmlns:a16="http://schemas.microsoft.com/office/drawing/2014/main" id="{6800EBD1-6634-473C-9296-4B8EABA69091}"/>
-              </a:ext>
-            </a:extLst>
-          </p:cNvPr>
-          <p:cNvPicPr>
-            <a:picLocks noChangeAspect="1"/>
-          </p:cNvPicPr>
-          <p:nvPr/>
-        </p:nvPicPr>
-        <p:blipFill>
-          <a:blip r:embed="rId2"/>
-          <a:stretch>
-            <a:fillRect/>
-          </a:stretch>
-        </p:blipFill>
-        <p:spPr>
-          <a:xfrm>
-            <a:off x="2987595" y="1742520"/>
-            <a:ext cx="1341236" cy="749873"/>
-          </a:xfrm>
-          <a:prstGeom prst="rect">
-            <a:avLst/>
-          </a:prstGeom>
-        </p:spPr>
-      </p:pic>
       <p:grpSp>
         <p:nvGrpSpPr>
           <p:cNvPr id="3" name="Group 2">
@@ -41950,6 +41986,36 @@
           </p:txBody>
         </p:sp>
       </p:grpSp>
+      <p:pic>
+        <p:nvPicPr>
+          <p:cNvPr id="60" name="Εικόνα 3">
+            <a:extLst>
+              <a:ext uri="{FF2B5EF4-FFF2-40B4-BE49-F238E27FC236}">
+                <a16:creationId xmlns:a16="http://schemas.microsoft.com/office/drawing/2014/main" id="{F71C8143-06CF-A52A-73F7-05513F361AAD}"/>
+              </a:ext>
+            </a:extLst>
+          </p:cNvPr>
+          <p:cNvPicPr>
+            <a:picLocks noChangeAspect="1"/>
+          </p:cNvPicPr>
+          <p:nvPr/>
+        </p:nvPicPr>
+        <p:blipFill>
+          <a:blip r:embed="rId2"/>
+          <a:stretch>
+            <a:fillRect/>
+          </a:stretch>
+        </p:blipFill>
+        <p:spPr>
+          <a:xfrm>
+            <a:off x="3013389" y="1642100"/>
+            <a:ext cx="1341236" cy="749873"/>
+          </a:xfrm>
+          <a:prstGeom prst="rect">
+            <a:avLst/>
+          </a:prstGeom>
+        </p:spPr>
+      </p:pic>
     </p:spTree>
     <p:extLst>
       <p:ext uri="{BB962C8B-B14F-4D97-AF65-F5344CB8AC3E}">
@@ -41966,7 +42032,7 @@
         <p14:prism isContent="1"/>
       </p:transition>
     </mc:Choice>
-    <mc:Fallback xmlns:a16="http://schemas.microsoft.com/office/drawing/2014/main" xmlns="">
+    <mc:Fallback xmlns="" xmlns:a16="http://schemas.microsoft.com/office/drawing/2014/main">
       <p:transition spd="slow">
         <p:fade/>
       </p:transition>
@@ -42044,7 +42110,7 @@
                                           </p:stCondLst>
                                         </p:cTn>
                                         <p:tgtEl>
-                                          <p:spTgt spid="88"/>
+                                          <p:spTgt spid="60"/>
                                         </p:tgtEl>
                                         <p:attrNameLst>
                                           <p:attrName>style.visibility</p:attrName>
@@ -42058,7 +42124,7 @@
                                       <p:cBhvr>
                                         <p:cTn id="10" dur="500"/>
                                         <p:tgtEl>
-                                          <p:spTgt spid="88"/>
+                                          <p:spTgt spid="60"/>
                                         </p:tgtEl>
                                       </p:cBhvr>
                                     </p:animEffect>

</xml_diff>